<commit_message>
week 6-13: tweak text
</commit_message>
<xml_diff>
--- a/diagrams/gitAndGithub/tag/sourcetree_1.pptx
+++ b/diagrams/gitAndGithub/tag/sourcetree_1.pptx
@@ -104,6 +104,22 @@
       </a:defRPr>
     </a:lvl9pPr>
   </p:defaultTextStyle>
+  <p:extLst>
+    <p:ext uri="{EFAFB233-063F-42B5-8137-9DF3F51BA10A}">
+      <p15:sldGuideLst xmlns:p15="http://schemas.microsoft.com/office/powerpoint/2012/main">
+        <p15:guide id="1" orient="horz" pos="2160">
+          <p15:clr>
+            <a:srgbClr val="A4A3A4"/>
+          </p15:clr>
+        </p15:guide>
+        <p15:guide id="2" pos="2880">
+          <p15:clr>
+            <a:srgbClr val="A4A3A4"/>
+          </p15:clr>
+        </p15:guide>
+      </p15:sldGuideLst>
+    </p:ext>
+  </p:extLst>
 </p:presentation>
 </file>
 
@@ -288,7 +304,7 @@
           <a:p>
             <a:fld id="{A1F532DB-2311-4BA7-A4CB-CC15A84E776B}" type="datetimeFigureOut">
               <a:rPr lang="en-SG" smtClean="0"/>
-              <a:t>14/7/2017</a:t>
+              <a:t>8/8/2019</a:t>
             </a:fld>
             <a:endParaRPr lang="en-SG"/>
           </a:p>
@@ -458,7 +474,7 @@
           <a:p>
             <a:fld id="{A1F532DB-2311-4BA7-A4CB-CC15A84E776B}" type="datetimeFigureOut">
               <a:rPr lang="en-SG" smtClean="0"/>
-              <a:t>14/7/2017</a:t>
+              <a:t>8/8/2019</a:t>
             </a:fld>
             <a:endParaRPr lang="en-SG"/>
           </a:p>
@@ -638,7 +654,7 @@
           <a:p>
             <a:fld id="{A1F532DB-2311-4BA7-A4CB-CC15A84E776B}" type="datetimeFigureOut">
               <a:rPr lang="en-SG" smtClean="0"/>
-              <a:t>14/7/2017</a:t>
+              <a:t>8/8/2019</a:t>
             </a:fld>
             <a:endParaRPr lang="en-SG"/>
           </a:p>
@@ -808,7 +824,7 @@
           <a:p>
             <a:fld id="{A1F532DB-2311-4BA7-A4CB-CC15A84E776B}" type="datetimeFigureOut">
               <a:rPr lang="en-SG" smtClean="0"/>
-              <a:t>14/7/2017</a:t>
+              <a:t>8/8/2019</a:t>
             </a:fld>
             <a:endParaRPr lang="en-SG"/>
           </a:p>
@@ -1054,7 +1070,7 @@
           <a:p>
             <a:fld id="{A1F532DB-2311-4BA7-A4CB-CC15A84E776B}" type="datetimeFigureOut">
               <a:rPr lang="en-SG" smtClean="0"/>
-              <a:t>14/7/2017</a:t>
+              <a:t>8/8/2019</a:t>
             </a:fld>
             <a:endParaRPr lang="en-SG"/>
           </a:p>
@@ -1342,7 +1358,7 @@
           <a:p>
             <a:fld id="{A1F532DB-2311-4BA7-A4CB-CC15A84E776B}" type="datetimeFigureOut">
               <a:rPr lang="en-SG" smtClean="0"/>
-              <a:t>14/7/2017</a:t>
+              <a:t>8/8/2019</a:t>
             </a:fld>
             <a:endParaRPr lang="en-SG"/>
           </a:p>
@@ -1764,7 +1780,7 @@
           <a:p>
             <a:fld id="{A1F532DB-2311-4BA7-A4CB-CC15A84E776B}" type="datetimeFigureOut">
               <a:rPr lang="en-SG" smtClean="0"/>
-              <a:t>14/7/2017</a:t>
+              <a:t>8/8/2019</a:t>
             </a:fld>
             <a:endParaRPr lang="en-SG"/>
           </a:p>
@@ -1882,7 +1898,7 @@
           <a:p>
             <a:fld id="{A1F532DB-2311-4BA7-A4CB-CC15A84E776B}" type="datetimeFigureOut">
               <a:rPr lang="en-SG" smtClean="0"/>
-              <a:t>14/7/2017</a:t>
+              <a:t>8/8/2019</a:t>
             </a:fld>
             <a:endParaRPr lang="en-SG"/>
           </a:p>
@@ -1977,7 +1993,7 @@
           <a:p>
             <a:fld id="{A1F532DB-2311-4BA7-A4CB-CC15A84E776B}" type="datetimeFigureOut">
               <a:rPr lang="en-SG" smtClean="0"/>
-              <a:t>14/7/2017</a:t>
+              <a:t>8/8/2019</a:t>
             </a:fld>
             <a:endParaRPr lang="en-SG"/>
           </a:p>
@@ -2254,7 +2270,7 @@
           <a:p>
             <a:fld id="{A1F532DB-2311-4BA7-A4CB-CC15A84E776B}" type="datetimeFigureOut">
               <a:rPr lang="en-SG" smtClean="0"/>
-              <a:t>14/7/2017</a:t>
+              <a:t>8/8/2019</a:t>
             </a:fld>
             <a:endParaRPr lang="en-SG"/>
           </a:p>
@@ -2507,7 +2523,7 @@
           <a:p>
             <a:fld id="{A1F532DB-2311-4BA7-A4CB-CC15A84E776B}" type="datetimeFigureOut">
               <a:rPr lang="en-SG" smtClean="0"/>
-              <a:t>14/7/2017</a:t>
+              <a:t>8/8/2019</a:t>
             </a:fld>
             <a:endParaRPr lang="en-SG"/>
           </a:p>
@@ -2720,7 +2736,7 @@
           <a:p>
             <a:fld id="{A1F532DB-2311-4BA7-A4CB-CC15A84E776B}" type="datetimeFigureOut">
               <a:rPr lang="en-SG" smtClean="0"/>
-              <a:t>14/7/2017</a:t>
+              <a:t>8/8/2019</a:t>
             </a:fld>
             <a:endParaRPr lang="en-SG"/>
           </a:p>
@@ -3111,7 +3127,7 @@
         </p:blipFill>
         <p:spPr>
           <a:xfrm>
-            <a:off x="4033837" y="2900362"/>
+            <a:off x="1907704" y="1052736"/>
             <a:ext cx="4124325" cy="1057275"/>
           </a:xfrm>
           <a:prstGeom prst="rect">
@@ -3134,7 +3150,7 @@
         </p:nvSpPr>
         <p:spPr>
           <a:xfrm flipH="1">
-            <a:off x="4427571" y="2997484"/>
+            <a:off x="2301438" y="1149858"/>
             <a:ext cx="596492" cy="575353"/>
           </a:xfrm>
           <a:prstGeom prst="leftArrow">
@@ -3179,6 +3195,83 @@
               <a:rPr lang="en-US" b="1" dirty="0" smtClean="0"/>
               <a:t>1</a:t>
             </a:r>
+            <a:endParaRPr lang="en-US" b="1" dirty="0"/>
+          </a:p>
+        </p:txBody>
+      </p:sp>
+      <p:pic>
+        <p:nvPicPr>
+          <p:cNvPr id="2" name="Picture 1"/>
+          <p:cNvPicPr>
+            <a:picLocks noChangeAspect="1"/>
+          </p:cNvPicPr>
+          <p:nvPr/>
+        </p:nvPicPr>
+        <p:blipFill>
+          <a:blip r:embed="rId3"/>
+          <a:stretch>
+            <a:fillRect/>
+          </a:stretch>
+        </p:blipFill>
+        <p:spPr>
+          <a:xfrm>
+            <a:off x="1763688" y="2852936"/>
+            <a:ext cx="5714286" cy="2219048"/>
+          </a:xfrm>
+          <a:prstGeom prst="rect">
+            <a:avLst/>
+          </a:prstGeom>
+        </p:spPr>
+      </p:pic>
+      <p:sp>
+        <p:nvSpPr>
+          <p:cNvPr id="5" name="Left Arrow 4"/>
+          <p:cNvSpPr/>
+          <p:nvPr/>
+        </p:nvSpPr>
+        <p:spPr>
+          <a:xfrm flipH="1">
+            <a:off x="1259632" y="4581128"/>
+            <a:ext cx="596492" cy="575353"/>
+          </a:xfrm>
+          <a:prstGeom prst="leftArrow">
+            <a:avLst/>
+          </a:prstGeom>
+          <a:solidFill>
+            <a:srgbClr val="C00000"/>
+          </a:solidFill>
+          <a:ln>
+            <a:noFill/>
+          </a:ln>
+          <a:effectLst>
+            <a:outerShdw blurRad="50800" dist="38100" dir="2700000" algn="tl" rotWithShape="0">
+              <a:prstClr val="black">
+                <a:alpha val="40000"/>
+              </a:prstClr>
+            </a:outerShdw>
+          </a:effectLst>
+        </p:spPr>
+        <p:style>
+          <a:lnRef idx="2">
+            <a:schemeClr val="accent1">
+              <a:shade val="50000"/>
+            </a:schemeClr>
+          </a:lnRef>
+          <a:fillRef idx="1">
+            <a:schemeClr val="accent1"/>
+          </a:fillRef>
+          <a:effectRef idx="0">
+            <a:schemeClr val="accent1"/>
+          </a:effectRef>
+          <a:fontRef idx="minor">
+            <a:schemeClr val="lt1"/>
+          </a:fontRef>
+        </p:style>
+        <p:txBody>
+          <a:bodyPr rtlCol="0" anchor="ctr"/>
+          <a:lstStyle/>
+          <a:p>
+            <a:pPr algn="ctr"/>
             <a:endParaRPr lang="en-US" b="1" dirty="0"/>
           </a:p>
         </p:txBody>

</xml_diff>